<commit_message>
Polymer routing and custom element organization
</commit_message>
<xml_diff>
--- a/docs/burndown.pptx
+++ b/docs/burndown.pptx
@@ -5,8 +5,9 @@
     <p:sldMasterId id="2147483648" r:id="rId1"/>
   </p:sldMasterIdLst>
   <p:sldIdLst>
-    <p:sldId id="256" r:id="rId2"/>
+    <p:sldId id="258" r:id="rId2"/>
     <p:sldId id="257" r:id="rId3"/>
+    <p:sldId id="256" r:id="rId4"/>
   </p:sldIdLst>
   <p:sldSz cx="12192000" cy="6858000"/>
   <p:notesSz cx="6858000" cy="9144000"/>
@@ -105,13 +106,18 @@
       </a:defRPr>
     </a:lvl9pPr>
   </p:defaultTextStyle>
+  <p:extLst>
+    <p:ext uri="{EFAFB233-063F-42B5-8137-9DF3F51BA10A}">
+      <p15:sldGuideLst xmlns:p15="http://schemas.microsoft.com/office/powerpoint/2012/main"/>
+    </p:ext>
+  </p:extLst>
 </p:presentation>
 </file>
 
 <file path=ppt/charts/chart1.xml><?xml version="1.0" encoding="utf-8"?>
 <c:chartSpace xmlns:c="http://schemas.openxmlformats.org/drawingml/2006/chart" xmlns:a="http://schemas.openxmlformats.org/drawingml/2006/main" xmlns:r="http://schemas.openxmlformats.org/officeDocument/2006/relationships" xmlns:c16r2="http://schemas.microsoft.com/office/drawing/2015/06/chart">
   <c:date1904 val="0"/>
-  <c:lang val="en-US"/>
+  <c:lang val="nl-NL"/>
   <c:roundedCorners val="0"/>
   <mc:AlternateContent xmlns:mc="http://schemas.openxmlformats.org/markup-compatibility/2006">
     <mc:Choice xmlns:c14="http://schemas.microsoft.com/office/drawing/2007/8/2/chart" Requires="c14">
@@ -1410,7 +1416,7 @@
             <a:fld id="{D57F1E4F-1CFF-5643-939E-217C01CDF565}" type="slidenum">
               <a:rPr lang="en-US" dirty="0"/>
               <a:pPr/>
-              <a:t>‹#›</a:t>
+              <a:t>‹nr.›</a:t>
             </a:fld>
             <a:endParaRPr lang="en-US" dirty="0"/>
           </a:p>
@@ -1637,7 +1643,7 @@
             <a:fld id="{D57F1E4F-1CFF-5643-939E-217C01CDF565}" type="slidenum">
               <a:rPr lang="en-US" dirty="0"/>
               <a:pPr/>
-              <a:t>‹#›</a:t>
+              <a:t>‹nr.›</a:t>
             </a:fld>
             <a:endParaRPr lang="en-US" dirty="0"/>
           </a:p>
@@ -1890,7 +1896,7 @@
             <a:fld id="{D57F1E4F-1CFF-5643-939E-217C01CDF565}" type="slidenum">
               <a:rPr lang="en-US" dirty="0"/>
               <a:pPr/>
-              <a:t>‹#›</a:t>
+              <a:t>‹nr.›</a:t>
             </a:fld>
             <a:endParaRPr lang="en-US" dirty="0"/>
           </a:p>
@@ -2111,7 +2117,7 @@
             <a:fld id="{D57F1E4F-1CFF-5643-939E-217C01CDF565}" type="slidenum">
               <a:rPr lang="en-US" dirty="0"/>
               <a:pPr/>
-              <a:t>‹#›</a:t>
+              <a:t>‹nr.›</a:t>
             </a:fld>
             <a:endParaRPr lang="en-US" dirty="0"/>
           </a:p>
@@ -2432,7 +2438,7 @@
             <a:fld id="{D57F1E4F-1CFF-5643-939E-217C01CDF565}" type="slidenum">
               <a:rPr lang="en-US" dirty="0"/>
               <a:pPr/>
-              <a:t>‹#›</a:t>
+              <a:t>‹nr.›</a:t>
             </a:fld>
             <a:endParaRPr lang="en-US" dirty="0"/>
           </a:p>
@@ -2709,7 +2715,7 @@
             <a:fld id="{D57F1E4F-1CFF-5643-939E-217C01CDF565}" type="slidenum">
               <a:rPr lang="en-US" dirty="0"/>
               <a:pPr/>
-              <a:t>‹#›</a:t>
+              <a:t>‹nr.›</a:t>
             </a:fld>
             <a:endParaRPr lang="en-US" dirty="0"/>
           </a:p>
@@ -3128,7 +3134,7 @@
             <a:fld id="{D57F1E4F-1CFF-5643-939E-217C01CDF565}" type="slidenum">
               <a:rPr lang="en-US" dirty="0"/>
               <a:pPr/>
-              <a:t>‹#›</a:t>
+              <a:t>‹nr.›</a:t>
             </a:fld>
             <a:endParaRPr lang="en-US" dirty="0"/>
           </a:p>
@@ -3220,7 +3226,7 @@
             <a:fld id="{D57F1E4F-1CFF-5643-939E-217C01CDF565}" type="slidenum">
               <a:rPr lang="en-US" dirty="0"/>
               <a:pPr/>
-              <a:t>‹#›</a:t>
+              <a:t>‹nr.›</a:t>
             </a:fld>
             <a:endParaRPr lang="en-US" dirty="0"/>
           </a:p>
@@ -3379,7 +3385,7 @@
             <a:fld id="{D57F1E4F-1CFF-5643-939E-217C01CDF565}" type="slidenum">
               <a:rPr lang="en-US" dirty="0"/>
               <a:pPr/>
-              <a:t>‹#›</a:t>
+              <a:t>‹nr.›</a:t>
             </a:fld>
             <a:endParaRPr lang="en-US" dirty="0"/>
           </a:p>
@@ -3776,7 +3782,7 @@
             <a:fld id="{D57F1E4F-1CFF-5643-939E-217C01CDF565}" type="slidenum">
               <a:rPr lang="en-US" dirty="0"/>
               <a:pPr/>
-              <a:t>‹#›</a:t>
+              <a:t>‹nr.›</a:t>
             </a:fld>
             <a:endParaRPr lang="en-US" dirty="0"/>
           </a:p>
@@ -4040,7 +4046,7 @@
             <a:fld id="{D57F1E4F-1CFF-5643-939E-217C01CDF565}" type="slidenum">
               <a:rPr lang="en-US" dirty="0"/>
               <a:pPr/>
-              <a:t>‹#›</a:t>
+              <a:t>‹nr.›</a:t>
             </a:fld>
             <a:endParaRPr lang="en-US" dirty="0"/>
           </a:p>
@@ -4280,7 +4286,7 @@
             <a:fld id="{D57F1E4F-1CFF-5643-939E-217C01CDF565}" type="slidenum">
               <a:rPr lang="en-US" dirty="0"/>
               <a:pPr/>
-              <a:t>‹#›</a:t>
+              <a:t>‹nr.›</a:t>
             </a:fld>
             <a:endParaRPr lang="en-US" dirty="0"/>
           </a:p>
@@ -4804,59 +4810,303 @@
       </p:grpSpPr>
       <p:sp>
         <p:nvSpPr>
-          <p:cNvPr id="4" name="Title 3"/>
-          <p:cNvSpPr>
-            <a:spLocks noGrp="1"/>
-          </p:cNvSpPr>
-          <p:nvPr>
-            <p:ph type="title"/>
-          </p:nvPr>
-        </p:nvSpPr>
-        <p:spPr/>
-        <p:txBody>
-          <a:bodyPr/>
+          <p:cNvPr id="2" name="Ovaal 1"/>
+          <p:cNvSpPr/>
+          <p:nvPr/>
+        </p:nvSpPr>
+        <p:spPr>
+          <a:xfrm>
+            <a:off x="1265274" y="2594344"/>
+            <a:ext cx="1956390" cy="1690576"/>
+          </a:xfrm>
+          <a:prstGeom prst="ellipse">
+            <a:avLst/>
+          </a:prstGeom>
+        </p:spPr>
+        <p:style>
+          <a:lnRef idx="2">
+            <a:schemeClr val="accent1">
+              <a:shade val="50000"/>
+            </a:schemeClr>
+          </a:lnRef>
+          <a:fillRef idx="1">
+            <a:schemeClr val="accent1"/>
+          </a:fillRef>
+          <a:effectRef idx="0">
+            <a:schemeClr val="accent1"/>
+          </a:effectRef>
+          <a:fontRef idx="minor">
+            <a:schemeClr val="lt1"/>
+          </a:fontRef>
+        </p:style>
+        <p:txBody>
+          <a:bodyPr rtlCol="0" anchor="ctr"/>
           <a:lstStyle/>
           <a:p>
+            <a:pPr algn="ctr"/>
             <a:r>
               <a:rPr lang="nl-NL" dirty="0" err="1"/>
-              <a:t>Burndown</a:t>
-            </a:r>
+              <a:t>Frontend</a:t>
+            </a:r>
+            <a:endParaRPr lang="nl-NL" dirty="0"/>
+          </a:p>
+          <a:p>
+            <a:pPr algn="ctr"/>
             <a:r>
               <a:rPr lang="nl-NL" dirty="0"/>
-              <a:t> Chart</a:t>
-            </a:r>
-          </a:p>
-        </p:txBody>
-      </p:sp>
-      <p:graphicFrame>
-        <p:nvGraphicFramePr>
-          <p:cNvPr id="8" name="Content Placeholder 7"/>
-          <p:cNvGraphicFramePr>
-            <a:graphicFrameLocks noGrp="1"/>
-          </p:cNvGraphicFramePr>
-          <p:nvPr>
-            <p:ph idx="1"/>
-            <p:extLst>
-              <p:ext uri="{D42A27DB-BD31-4B8C-83A1-F6EECF244321}">
-                <p14:modId xmlns:p14="http://schemas.microsoft.com/office/powerpoint/2010/main" val="3740276080"/>
-              </p:ext>
-            </p:extLst>
-          </p:nvPr>
-        </p:nvGraphicFramePr>
-        <p:xfrm>
-          <a:off x="581025" y="2181225"/>
-          <a:ext cx="11029950" cy="3678238"/>
-        </p:xfrm>
-        <a:graphic>
-          <a:graphicData uri="http://schemas.openxmlformats.org/drawingml/2006/chart">
-            <c:chart xmlns:c="http://schemas.openxmlformats.org/drawingml/2006/chart" xmlns:r="http://schemas.openxmlformats.org/officeDocument/2006/relationships" r:id="rId2"/>
-          </a:graphicData>
-        </a:graphic>
-      </p:graphicFrame>
+              <a:t>(Interactie gebruiker)</a:t>
+            </a:r>
+          </a:p>
+        </p:txBody>
+      </p:sp>
+      <p:sp>
+        <p:nvSpPr>
+          <p:cNvPr id="20" name="Ovaal 19"/>
+          <p:cNvSpPr/>
+          <p:nvPr/>
+        </p:nvSpPr>
+        <p:spPr>
+          <a:xfrm>
+            <a:off x="5018566" y="2594344"/>
+            <a:ext cx="1956390" cy="1690576"/>
+          </a:xfrm>
+          <a:prstGeom prst="ellipse">
+            <a:avLst/>
+          </a:prstGeom>
+        </p:spPr>
+        <p:style>
+          <a:lnRef idx="2">
+            <a:schemeClr val="accent1">
+              <a:shade val="50000"/>
+            </a:schemeClr>
+          </a:lnRef>
+          <a:fillRef idx="1">
+            <a:schemeClr val="accent1"/>
+          </a:fillRef>
+          <a:effectRef idx="0">
+            <a:schemeClr val="accent1"/>
+          </a:effectRef>
+          <a:fontRef idx="minor">
+            <a:schemeClr val="lt1"/>
+          </a:fontRef>
+        </p:style>
+        <p:txBody>
+          <a:bodyPr rtlCol="0" anchor="ctr"/>
+          <a:lstStyle/>
+          <a:p>
+            <a:pPr algn="ctr"/>
+            <a:r>
+              <a:rPr lang="nl-NL" dirty="0"/>
+              <a:t>Backend</a:t>
+            </a:r>
+          </a:p>
+          <a:p>
+            <a:pPr algn="ctr"/>
+            <a:r>
+              <a:rPr lang="nl-NL" dirty="0"/>
+              <a:t>(Business logic)</a:t>
+            </a:r>
+          </a:p>
+        </p:txBody>
+      </p:sp>
+      <p:sp>
+        <p:nvSpPr>
+          <p:cNvPr id="3" name="Rechthoek: afgeronde hoeken 2"/>
+          <p:cNvSpPr/>
+          <p:nvPr/>
+        </p:nvSpPr>
+        <p:spPr>
+          <a:xfrm>
+            <a:off x="8006315" y="1233376"/>
+            <a:ext cx="2317898" cy="999461"/>
+          </a:xfrm>
+          <a:prstGeom prst="roundRect">
+            <a:avLst/>
+          </a:prstGeom>
+        </p:spPr>
+        <p:style>
+          <a:lnRef idx="2">
+            <a:schemeClr val="accent1">
+              <a:shade val="50000"/>
+            </a:schemeClr>
+          </a:lnRef>
+          <a:fillRef idx="1">
+            <a:schemeClr val="accent1"/>
+          </a:fillRef>
+          <a:effectRef idx="0">
+            <a:schemeClr val="accent1"/>
+          </a:effectRef>
+          <a:fontRef idx="minor">
+            <a:schemeClr val="lt1"/>
+          </a:fontRef>
+        </p:style>
+        <p:txBody>
+          <a:bodyPr rtlCol="0" anchor="ctr"/>
+          <a:lstStyle/>
+          <a:p>
+            <a:pPr algn="ctr"/>
+            <a:r>
+              <a:rPr lang="nl-NL" dirty="0"/>
+              <a:t>The Open Movie Database</a:t>
+            </a:r>
+          </a:p>
+        </p:txBody>
+      </p:sp>
+      <p:cxnSp>
+        <p:nvCxnSpPr>
+          <p:cNvPr id="11" name="Rechte verbindingslijn met pijl 10"/>
+          <p:cNvCxnSpPr>
+            <a:stCxn id="2" idx="6"/>
+            <a:endCxn id="20" idx="2"/>
+          </p:cNvCxnSpPr>
+          <p:nvPr/>
+        </p:nvCxnSpPr>
+        <p:spPr>
+          <a:xfrm>
+            <a:off x="3221664" y="3439632"/>
+            <a:ext cx="1796902" cy="0"/>
+          </a:xfrm>
+          <a:prstGeom prst="straightConnector1">
+            <a:avLst/>
+          </a:prstGeom>
+          <a:ln>
+            <a:tailEnd type="triangle"/>
+          </a:ln>
+        </p:spPr>
+        <p:style>
+          <a:lnRef idx="1">
+            <a:schemeClr val="accent1"/>
+          </a:lnRef>
+          <a:fillRef idx="0">
+            <a:schemeClr val="accent1"/>
+          </a:fillRef>
+          <a:effectRef idx="0">
+            <a:schemeClr val="accent1"/>
+          </a:effectRef>
+          <a:fontRef idx="minor">
+            <a:schemeClr val="tx1"/>
+          </a:fontRef>
+        </p:style>
+      </p:cxnSp>
+      <p:cxnSp>
+        <p:nvCxnSpPr>
+          <p:cNvPr id="15" name="Rechte verbindingslijn met pijl 14"/>
+          <p:cNvCxnSpPr>
+            <a:stCxn id="20" idx="7"/>
+            <a:endCxn id="3" idx="1"/>
+          </p:cNvCxnSpPr>
+          <p:nvPr/>
+        </p:nvCxnSpPr>
+        <p:spPr>
+          <a:xfrm flipV="1">
+            <a:off x="6688449" y="1733107"/>
+            <a:ext cx="1317866" cy="1108816"/>
+          </a:xfrm>
+          <a:prstGeom prst="straightConnector1">
+            <a:avLst/>
+          </a:prstGeom>
+          <a:ln>
+            <a:tailEnd type="triangle"/>
+          </a:ln>
+        </p:spPr>
+        <p:style>
+          <a:lnRef idx="1">
+            <a:schemeClr val="accent1"/>
+          </a:lnRef>
+          <a:fillRef idx="0">
+            <a:schemeClr val="accent1"/>
+          </a:fillRef>
+          <a:effectRef idx="0">
+            <a:schemeClr val="accent1"/>
+          </a:effectRef>
+          <a:fontRef idx="minor">
+            <a:schemeClr val="tx1"/>
+          </a:fontRef>
+        </p:style>
+      </p:cxnSp>
+      <p:sp>
+        <p:nvSpPr>
+          <p:cNvPr id="27" name="Rechthoek: afgeronde hoeken 26"/>
+          <p:cNvSpPr/>
+          <p:nvPr/>
+        </p:nvSpPr>
+        <p:spPr>
+          <a:xfrm>
+            <a:off x="8006315" y="4593264"/>
+            <a:ext cx="2317898" cy="999461"/>
+          </a:xfrm>
+          <a:prstGeom prst="roundRect">
+            <a:avLst/>
+          </a:prstGeom>
+        </p:spPr>
+        <p:style>
+          <a:lnRef idx="2">
+            <a:schemeClr val="accent1">
+              <a:shade val="50000"/>
+            </a:schemeClr>
+          </a:lnRef>
+          <a:fillRef idx="1">
+            <a:schemeClr val="accent1"/>
+          </a:fillRef>
+          <a:effectRef idx="0">
+            <a:schemeClr val="accent1"/>
+          </a:effectRef>
+          <a:fontRef idx="minor">
+            <a:schemeClr val="lt1"/>
+          </a:fontRef>
+        </p:style>
+        <p:txBody>
+          <a:bodyPr rtlCol="0" anchor="ctr"/>
+          <a:lstStyle/>
+          <a:p>
+            <a:pPr algn="ctr"/>
+            <a:r>
+              <a:rPr lang="nl-NL" dirty="0"/>
+              <a:t>Database</a:t>
+            </a:r>
+          </a:p>
+        </p:txBody>
+      </p:sp>
+      <p:cxnSp>
+        <p:nvCxnSpPr>
+          <p:cNvPr id="19" name="Rechte verbindingslijn met pijl 18"/>
+          <p:cNvCxnSpPr>
+            <a:stCxn id="20" idx="6"/>
+            <a:endCxn id="27" idx="1"/>
+          </p:cNvCxnSpPr>
+          <p:nvPr/>
+        </p:nvCxnSpPr>
+        <p:spPr>
+          <a:xfrm>
+            <a:off x="6974956" y="3439632"/>
+            <a:ext cx="1031359" cy="1653363"/>
+          </a:xfrm>
+          <a:prstGeom prst="straightConnector1">
+            <a:avLst/>
+          </a:prstGeom>
+          <a:ln>
+            <a:tailEnd type="triangle"/>
+          </a:ln>
+        </p:spPr>
+        <p:style>
+          <a:lnRef idx="1">
+            <a:schemeClr val="accent1"/>
+          </a:lnRef>
+          <a:fillRef idx="0">
+            <a:schemeClr val="accent1"/>
+          </a:fillRef>
+          <a:effectRef idx="0">
+            <a:schemeClr val="accent1"/>
+          </a:effectRef>
+          <a:fontRef idx="minor">
+            <a:schemeClr val="tx1"/>
+          </a:fontRef>
+        </p:style>
+      </p:cxnSp>
     </p:spTree>
     <p:extLst>
       <p:ext uri="{BB962C8B-B14F-4D97-AF65-F5344CB8AC3E}">
-        <p14:creationId xmlns:p14="http://schemas.microsoft.com/office/powerpoint/2010/main" val="1069502355"/>
+        <p14:creationId xmlns:p14="http://schemas.microsoft.com/office/powerpoint/2010/main" val="217861650"/>
       </p:ext>
     </p:extLst>
   </p:cSld>
@@ -5466,6 +5716,87 @@
     <p:extLst>
       <p:ext uri="{BB962C8B-B14F-4D97-AF65-F5344CB8AC3E}">
         <p14:creationId xmlns:p14="http://schemas.microsoft.com/office/powerpoint/2010/main" val="677869771"/>
+      </p:ext>
+    </p:extLst>
+  </p:cSld>
+  <p:clrMapOvr>
+    <a:masterClrMapping/>
+  </p:clrMapOvr>
+</p:sld>
+</file>
+
+<file path=ppt/slides/slide3.xml><?xml version="1.0" encoding="utf-8"?>
+<p:sld xmlns:a="http://schemas.openxmlformats.org/drawingml/2006/main" xmlns:r="http://schemas.openxmlformats.org/officeDocument/2006/relationships" xmlns:p="http://schemas.openxmlformats.org/presentationml/2006/main">
+  <p:cSld>
+    <p:spTree>
+      <p:nvGrpSpPr>
+        <p:cNvPr id="1" name=""/>
+        <p:cNvGrpSpPr/>
+        <p:nvPr/>
+      </p:nvGrpSpPr>
+      <p:grpSpPr>
+        <a:xfrm>
+          <a:off x="0" y="0"/>
+          <a:ext cx="0" cy="0"/>
+          <a:chOff x="0" y="0"/>
+          <a:chExt cx="0" cy="0"/>
+        </a:xfrm>
+      </p:grpSpPr>
+      <p:sp>
+        <p:nvSpPr>
+          <p:cNvPr id="4" name="Title 3"/>
+          <p:cNvSpPr>
+            <a:spLocks noGrp="1"/>
+          </p:cNvSpPr>
+          <p:nvPr>
+            <p:ph type="title"/>
+          </p:nvPr>
+        </p:nvSpPr>
+        <p:spPr/>
+        <p:txBody>
+          <a:bodyPr/>
+          <a:lstStyle/>
+          <a:p>
+            <a:r>
+              <a:rPr lang="nl-NL" dirty="0" err="1"/>
+              <a:t>Burndown</a:t>
+            </a:r>
+            <a:r>
+              <a:rPr lang="nl-NL" dirty="0"/>
+              <a:t> Chart</a:t>
+            </a:r>
+          </a:p>
+        </p:txBody>
+      </p:sp>
+      <p:graphicFrame>
+        <p:nvGraphicFramePr>
+          <p:cNvPr id="8" name="Content Placeholder 7"/>
+          <p:cNvGraphicFramePr>
+            <a:graphicFrameLocks noGrp="1"/>
+          </p:cNvGraphicFramePr>
+          <p:nvPr>
+            <p:ph idx="1"/>
+            <p:extLst>
+              <p:ext uri="{D42A27DB-BD31-4B8C-83A1-F6EECF244321}">
+                <p14:modId xmlns:p14="http://schemas.microsoft.com/office/powerpoint/2010/main" val="3740276080"/>
+              </p:ext>
+            </p:extLst>
+          </p:nvPr>
+        </p:nvGraphicFramePr>
+        <p:xfrm>
+          <a:off x="581025" y="2181225"/>
+          <a:ext cx="11029950" cy="3678238"/>
+        </p:xfrm>
+        <a:graphic>
+          <a:graphicData uri="http://schemas.openxmlformats.org/drawingml/2006/chart">
+            <c:chart xmlns:c="http://schemas.openxmlformats.org/drawingml/2006/chart" xmlns:r="http://schemas.openxmlformats.org/officeDocument/2006/relationships" r:id="rId2"/>
+          </a:graphicData>
+        </a:graphic>
+      </p:graphicFrame>
+    </p:spTree>
+    <p:extLst>
+      <p:ext uri="{BB962C8B-B14F-4D97-AF65-F5344CB8AC3E}">
+        <p14:creationId xmlns:p14="http://schemas.microsoft.com/office/powerpoint/2010/main" val="1069502355"/>
       </p:ext>
     </p:extLst>
   </p:cSld>

</xml_diff>